<commit_message>
Fixed some problems, added 2
</commit_message>
<xml_diff>
--- a/3/shapes/3-c.pptx
+++ b/3/shapes/3-c.pptx
@@ -104,6 +104,11 @@
       </a:defRPr>
     </a:lvl9pPr>
   </p:defaultTextStyle>
+  <p:extLst>
+    <p:ext uri="{EFAFB233-063F-42B5-8137-9DF3F51BA10A}">
+      <p15:sldGuideLst xmlns:p15="http://schemas.microsoft.com/office/powerpoint/2012/main"/>
+    </p:ext>
+  </p:extLst>
 </p:presentation>
 </file>
 
@@ -254,7 +259,7 @@
           <a:p>
             <a:fld id="{F386BE67-95CB-41ED-B55C-E69E666CA721}" type="datetimeFigureOut">
               <a:rPr lang="en-US" smtClean="0"/>
-              <a:t>2023-06-08</a:t>
+              <a:t>2023-06-17</a:t>
             </a:fld>
             <a:endParaRPr lang="en-US"/>
           </a:p>
@@ -452,7 +457,7 @@
           <a:p>
             <a:fld id="{F386BE67-95CB-41ED-B55C-E69E666CA721}" type="datetimeFigureOut">
               <a:rPr lang="en-US" smtClean="0"/>
-              <a:t>2023-06-08</a:t>
+              <a:t>2023-06-17</a:t>
             </a:fld>
             <a:endParaRPr lang="en-US"/>
           </a:p>
@@ -660,7 +665,7 @@
           <a:p>
             <a:fld id="{F386BE67-95CB-41ED-B55C-E69E666CA721}" type="datetimeFigureOut">
               <a:rPr lang="en-US" smtClean="0"/>
-              <a:t>2023-06-08</a:t>
+              <a:t>2023-06-17</a:t>
             </a:fld>
             <a:endParaRPr lang="en-US"/>
           </a:p>
@@ -858,7 +863,7 @@
           <a:p>
             <a:fld id="{F386BE67-95CB-41ED-B55C-E69E666CA721}" type="datetimeFigureOut">
               <a:rPr lang="en-US" smtClean="0"/>
-              <a:t>2023-06-08</a:t>
+              <a:t>2023-06-17</a:t>
             </a:fld>
             <a:endParaRPr lang="en-US"/>
           </a:p>
@@ -1133,7 +1138,7 @@
           <a:p>
             <a:fld id="{F386BE67-95CB-41ED-B55C-E69E666CA721}" type="datetimeFigureOut">
               <a:rPr lang="en-US" smtClean="0"/>
-              <a:t>2023-06-08</a:t>
+              <a:t>2023-06-17</a:t>
             </a:fld>
             <a:endParaRPr lang="en-US"/>
           </a:p>
@@ -1398,7 +1403,7 @@
           <a:p>
             <a:fld id="{F386BE67-95CB-41ED-B55C-E69E666CA721}" type="datetimeFigureOut">
               <a:rPr lang="en-US" smtClean="0"/>
-              <a:t>2023-06-08</a:t>
+              <a:t>2023-06-17</a:t>
             </a:fld>
             <a:endParaRPr lang="en-US"/>
           </a:p>
@@ -1810,7 +1815,7 @@
           <a:p>
             <a:fld id="{F386BE67-95CB-41ED-B55C-E69E666CA721}" type="datetimeFigureOut">
               <a:rPr lang="en-US" smtClean="0"/>
-              <a:t>2023-06-08</a:t>
+              <a:t>2023-06-17</a:t>
             </a:fld>
             <a:endParaRPr lang="en-US"/>
           </a:p>
@@ -1951,7 +1956,7 @@
           <a:p>
             <a:fld id="{F386BE67-95CB-41ED-B55C-E69E666CA721}" type="datetimeFigureOut">
               <a:rPr lang="en-US" smtClean="0"/>
-              <a:t>2023-06-08</a:t>
+              <a:t>2023-06-17</a:t>
             </a:fld>
             <a:endParaRPr lang="en-US"/>
           </a:p>
@@ -2064,7 +2069,7 @@
           <a:p>
             <a:fld id="{F386BE67-95CB-41ED-B55C-E69E666CA721}" type="datetimeFigureOut">
               <a:rPr lang="en-US" smtClean="0"/>
-              <a:t>2023-06-08</a:t>
+              <a:t>2023-06-17</a:t>
             </a:fld>
             <a:endParaRPr lang="en-US"/>
           </a:p>
@@ -2375,7 +2380,7 @@
           <a:p>
             <a:fld id="{F386BE67-95CB-41ED-B55C-E69E666CA721}" type="datetimeFigureOut">
               <a:rPr lang="en-US" smtClean="0"/>
-              <a:t>2023-06-08</a:t>
+              <a:t>2023-06-17</a:t>
             </a:fld>
             <a:endParaRPr lang="en-US"/>
           </a:p>
@@ -2663,7 +2668,7 @@
           <a:p>
             <a:fld id="{F386BE67-95CB-41ED-B55C-E69E666CA721}" type="datetimeFigureOut">
               <a:rPr lang="en-US" smtClean="0"/>
-              <a:t>2023-06-08</a:t>
+              <a:t>2023-06-17</a:t>
             </a:fld>
             <a:endParaRPr lang="en-US"/>
           </a:p>
@@ -2904,7 +2909,7 @@
           <a:p>
             <a:fld id="{F386BE67-95CB-41ED-B55C-E69E666CA721}" type="datetimeFigureOut">
               <a:rPr lang="en-US" smtClean="0"/>
-              <a:t>2023-06-08</a:t>
+              <a:t>2023-06-17</a:t>
             </a:fld>
             <a:endParaRPr lang="en-US"/>
           </a:p>
@@ -4473,7 +4478,7 @@
         </p:nvCxnSpPr>
         <p:spPr>
           <a:xfrm>
-            <a:off x="7229696" y="3931138"/>
+            <a:off x="6406736" y="3931138"/>
             <a:ext cx="1846217" cy="0"/>
           </a:xfrm>
           <a:prstGeom prst="line">
@@ -4511,7 +4516,7 @@
         </p:nvCxnSpPr>
         <p:spPr>
           <a:xfrm>
-            <a:off x="7229696" y="3604567"/>
+            <a:off x="6406736" y="3604567"/>
             <a:ext cx="0" cy="666206"/>
           </a:xfrm>
           <a:prstGeom prst="line">
@@ -4549,7 +4554,7 @@
         </p:nvCxnSpPr>
         <p:spPr>
           <a:xfrm>
-            <a:off x="7747856" y="3604567"/>
+            <a:off x="6924896" y="3604567"/>
             <a:ext cx="0" cy="666206"/>
           </a:xfrm>
           <a:prstGeom prst="line">
@@ -4587,7 +4592,7 @@
         </p:nvCxnSpPr>
         <p:spPr>
           <a:xfrm>
-            <a:off x="9075913" y="3598035"/>
+            <a:off x="8252953" y="3598035"/>
             <a:ext cx="0" cy="666206"/>
           </a:xfrm>
           <a:prstGeom prst="line">
@@ -4623,7 +4628,7 @@
         </p:nvSpPr>
         <p:spPr>
           <a:xfrm>
-            <a:off x="7255821" y="3598035"/>
+            <a:off x="6432861" y="3598035"/>
             <a:ext cx="483326" cy="369332"/>
           </a:xfrm>
           <a:prstGeom prst="rect">
@@ -4662,7 +4667,7 @@
         </p:nvSpPr>
         <p:spPr>
           <a:xfrm>
-            <a:off x="8170222" y="3598035"/>
+            <a:off x="7347262" y="3598035"/>
             <a:ext cx="483326" cy="369332"/>
           </a:xfrm>
           <a:prstGeom prst="rect">
@@ -4701,8 +4706,8 @@
         </p:nvCxnSpPr>
         <p:spPr>
           <a:xfrm>
-            <a:off x="6736076" y="3258400"/>
-            <a:ext cx="492038" cy="0"/>
+            <a:off x="5401052" y="3258400"/>
+            <a:ext cx="1652141" cy="0"/>
           </a:xfrm>
           <a:prstGeom prst="line">
             <a:avLst/>
@@ -4739,7 +4744,7 @@
         </p:nvCxnSpPr>
         <p:spPr>
           <a:xfrm>
-            <a:off x="6745602" y="2931829"/>
+            <a:off x="5410578" y="2931829"/>
             <a:ext cx="0" cy="666206"/>
           </a:xfrm>
           <a:prstGeom prst="line">
@@ -4777,7 +4782,7 @@
         </p:nvCxnSpPr>
         <p:spPr>
           <a:xfrm>
-            <a:off x="7230421" y="2931829"/>
+            <a:off x="5895397" y="2931829"/>
             <a:ext cx="0" cy="666206"/>
           </a:xfrm>
           <a:prstGeom prst="line">
@@ -4813,7 +4818,7 @@
         </p:nvSpPr>
         <p:spPr>
           <a:xfrm>
-            <a:off x="6752675" y="2925297"/>
+            <a:off x="5417651" y="2891956"/>
             <a:ext cx="483326" cy="369332"/>
           </a:xfrm>
           <a:prstGeom prst="rect">
@@ -4835,6 +4840,81 @@
               </a:rPr>
               <a:t>1</a:t>
             </a:r>
+          </a:p>
+        </p:txBody>
+      </p:sp>
+      <p:cxnSp>
+        <p:nvCxnSpPr>
+          <p:cNvPr id="61" name="Straight Connector 60">
+            <a:extLst>
+              <a:ext uri="{FF2B5EF4-FFF2-40B4-BE49-F238E27FC236}">
+                <a16:creationId xmlns:a16="http://schemas.microsoft.com/office/drawing/2014/main" id="{719B2375-94CE-3084-95D8-620239591C6D}"/>
+              </a:ext>
+            </a:extLst>
+          </p:cNvPr>
+          <p:cNvCxnSpPr>
+            <a:cxnSpLocks/>
+          </p:cNvCxnSpPr>
+          <p:nvPr/>
+        </p:nvCxnSpPr>
+        <p:spPr>
+          <a:xfrm>
+            <a:off x="7053193" y="2922859"/>
+            <a:ext cx="0" cy="666206"/>
+          </a:xfrm>
+          <a:prstGeom prst="line">
+            <a:avLst/>
+          </a:prstGeom>
+        </p:spPr>
+        <p:style>
+          <a:lnRef idx="3">
+            <a:schemeClr val="dk1"/>
+          </a:lnRef>
+          <a:fillRef idx="0">
+            <a:schemeClr val="dk1"/>
+          </a:fillRef>
+          <a:effectRef idx="2">
+            <a:schemeClr val="dk1"/>
+          </a:effectRef>
+          <a:fontRef idx="minor">
+            <a:schemeClr val="tx1"/>
+          </a:fontRef>
+        </p:style>
+      </p:cxnSp>
+      <p:sp>
+        <p:nvSpPr>
+          <p:cNvPr id="62" name="TextBox 61">
+            <a:extLst>
+              <a:ext uri="{FF2B5EF4-FFF2-40B4-BE49-F238E27FC236}">
+                <a16:creationId xmlns:a16="http://schemas.microsoft.com/office/drawing/2014/main" id="{367A6698-5DEC-2CCB-CFAD-0F1042F0DC03}"/>
+              </a:ext>
+            </a:extLst>
+          </p:cNvPr>
+          <p:cNvSpPr txBox="1"/>
+          <p:nvPr/>
+        </p:nvSpPr>
+        <p:spPr>
+          <a:xfrm>
+            <a:off x="6149883" y="2922859"/>
+            <a:ext cx="483326" cy="369332"/>
+          </a:xfrm>
+          <a:prstGeom prst="rect">
+            <a:avLst/>
+          </a:prstGeom>
+          <a:noFill/>
+        </p:spPr>
+        <p:txBody>
+          <a:bodyPr wrap="square" rtlCol="0">
+            <a:spAutoFit/>
+          </a:bodyPr>
+          <a:lstStyle/>
+          <a:p>
+            <a:pPr algn="ctr"/>
+            <a:r>
+              <a:rPr lang="fa-IR" dirty="0"/>
+              <a:t>64</a:t>
+            </a:r>
+            <a:endParaRPr lang="en-US" dirty="0"/>
           </a:p>
         </p:txBody>
       </p:sp>

</xml_diff>